<commit_message>
Statement updates, pptx update
Added assign functionality, added slides and pictures to powerpoint
</commit_message>
<xml_diff>
--- a/ProjectFIRE.pptx
+++ b/ProjectFIRE.pptx
@@ -10,8 +10,9 @@
     <p:sldId id="257" r:id="rId4"/>
     <p:sldId id="259" r:id="rId5"/>
     <p:sldId id="260" r:id="rId6"/>
-    <p:sldId id="261" r:id="rId7"/>
-    <p:sldId id="262" r:id="rId8"/>
+    <p:sldId id="262" r:id="rId7"/>
+    <p:sldId id="264" r:id="rId8"/>
+    <p:sldId id="263" r:id="rId9"/>
   </p:sldIdLst>
   <p:sldSz cx="12192000" cy="6858000"/>
   <p:notesSz cx="6858000" cy="9144000"/>
@@ -110,6 +111,11 @@
       </a:defRPr>
     </a:lvl9pPr>
   </p:defaultTextStyle>
+  <p:extLst>
+    <p:ext uri="{EFAFB233-063F-42B5-8137-9DF3F51BA10A}">
+      <p15:sldGuideLst xmlns:p15="http://schemas.microsoft.com/office/powerpoint/2012/main"/>
+    </p:ext>
+  </p:extLst>
 </p:presentation>
 </file>
 
@@ -283,7 +289,7 @@
             <a:fld id="{87DE6118-2437-4B30-8E3C-4D2BE6020583}" type="datetimeFigureOut">
               <a:rPr lang="en-US" dirty="0"/>
               <a:pPr/>
-              <a:t>12/4/2017</a:t>
+              <a:t>12/5/2017</a:t>
             </a:fld>
             <a:endParaRPr lang="en-US" dirty="0"/>
           </a:p>
@@ -609,7 +615,7 @@
           <a:p>
             <a:fld id="{87DE6118-2437-4B30-8E3C-4D2BE6020583}" type="datetimeFigureOut">
               <a:rPr lang="en-US" dirty="0"/>
-              <a:t>12/4/2017</a:t>
+              <a:t>12/5/2017</a:t>
             </a:fld>
             <a:endParaRPr lang="en-US" dirty="0"/>
           </a:p>
@@ -784,7 +790,7 @@
           <a:p>
             <a:fld id="{87DE6118-2437-4B30-8E3C-4D2BE6020583}" type="datetimeFigureOut">
               <a:rPr lang="en-US" dirty="0"/>
-              <a:t>12/4/2017</a:t>
+              <a:t>12/5/2017</a:t>
             </a:fld>
             <a:endParaRPr lang="en-US" dirty="0"/>
           </a:p>
@@ -949,7 +955,7 @@
           <a:p>
             <a:fld id="{87DE6118-2437-4B30-8E3C-4D2BE6020583}" type="datetimeFigureOut">
               <a:rPr lang="en-US" dirty="0"/>
-              <a:t>12/4/2017</a:t>
+              <a:t>12/5/2017</a:t>
             </a:fld>
             <a:endParaRPr lang="en-US" dirty="0"/>
           </a:p>
@@ -1222,7 +1228,7 @@
             <a:fld id="{87DE6118-2437-4B30-8E3C-4D2BE6020583}" type="datetimeFigureOut">
               <a:rPr lang="en-US" dirty="0"/>
               <a:pPr/>
-              <a:t>12/4/2017</a:t>
+              <a:t>12/5/2017</a:t>
             </a:fld>
             <a:endParaRPr lang="en-US" dirty="0"/>
           </a:p>
@@ -1612,7 +1618,7 @@
           <a:p>
             <a:fld id="{87DE6118-2437-4B30-8E3C-4D2BE6020583}" type="datetimeFigureOut">
               <a:rPr lang="en-US" dirty="0"/>
-              <a:t>12/4/2017</a:t>
+              <a:t>12/5/2017</a:t>
             </a:fld>
             <a:endParaRPr lang="en-US" dirty="0"/>
           </a:p>
@@ -2084,7 +2090,7 @@
           <a:p>
             <a:fld id="{87DE6118-2437-4B30-8E3C-4D2BE6020583}" type="datetimeFigureOut">
               <a:rPr lang="en-US" dirty="0"/>
-              <a:t>12/4/2017</a:t>
+              <a:t>12/5/2017</a:t>
             </a:fld>
             <a:endParaRPr lang="en-US" dirty="0"/>
           </a:p>
@@ -2197,7 +2203,7 @@
           <a:p>
             <a:fld id="{87DE6118-2437-4B30-8E3C-4D2BE6020583}" type="datetimeFigureOut">
               <a:rPr lang="en-US" dirty="0"/>
-              <a:t>12/4/2017</a:t>
+              <a:t>12/5/2017</a:t>
             </a:fld>
             <a:endParaRPr lang="en-US" dirty="0"/>
           </a:p>
@@ -2287,7 +2293,7 @@
           <a:p>
             <a:fld id="{87DE6118-2437-4B30-8E3C-4D2BE6020583}" type="datetimeFigureOut">
               <a:rPr lang="en-US" dirty="0"/>
-              <a:t>12/4/2017</a:t>
+              <a:t>12/5/2017</a:t>
             </a:fld>
             <a:endParaRPr lang="en-US" dirty="0"/>
           </a:p>
@@ -2629,7 +2635,7 @@
             <a:fld id="{87DE6118-2437-4B30-8E3C-4D2BE6020583}" type="datetimeFigureOut">
               <a:rPr lang="en-US" dirty="0"/>
               <a:pPr/>
-              <a:t>12/4/2017</a:t>
+              <a:t>12/5/2017</a:t>
             </a:fld>
             <a:endParaRPr lang="en-US" dirty="0"/>
           </a:p>
@@ -3014,7 +3020,7 @@
             <a:fld id="{87DE6118-2437-4B30-8E3C-4D2BE6020583}" type="datetimeFigureOut">
               <a:rPr lang="en-US" dirty="0"/>
               <a:pPr/>
-              <a:t>12/4/2017</a:t>
+              <a:t>12/5/2017</a:t>
             </a:fld>
             <a:endParaRPr lang="en-US" dirty="0"/>
           </a:p>
@@ -3289,7 +3295,7 @@
             <a:fld id="{87DE6118-2437-4B30-8E3C-4D2BE6020583}" type="datetimeFigureOut">
               <a:rPr lang="en-US" dirty="0"/>
               <a:pPr/>
-              <a:t>12/4/2017</a:t>
+              <a:t>12/5/2017</a:t>
             </a:fld>
             <a:endParaRPr lang="en-US" dirty="0"/>
           </a:p>
@@ -4057,29 +4063,48 @@
           <a:lstStyle/>
           <a:p>
             <a:r>
+              <a:rPr lang="en-US" dirty="0"/>
+              <a:t>Interpreted</a:t>
+            </a:r>
+          </a:p>
+          <a:p>
+            <a:r>
+              <a:rPr lang="en-US" dirty="0"/>
+              <a:t>Client-side</a:t>
+            </a:r>
+          </a:p>
+          <a:p>
+            <a:pPr lvl="1"/>
+            <a:r>
+              <a:rPr lang="en-US" dirty="0"/>
+              <a:t>HTML &amp; JavaScript</a:t>
+            </a:r>
+          </a:p>
+          <a:p>
+            <a:r>
+              <a:rPr lang="en-US" dirty="0"/>
+              <a:t>Loosely-typed </a:t>
+            </a:r>
+            <a:r>
+              <a:rPr lang="en-US" dirty="0" smtClean="0">
+                <a:sym typeface="Wingdings" panose="05000000000000000000" pitchFamily="2" charset="2"/>
+              </a:rPr>
+              <a:t></a:t>
+            </a:r>
+            <a:r>
               <a:rPr lang="en-US" dirty="0" smtClean="0"/>
-              <a:t>Interpreted</a:t>
-            </a:r>
-          </a:p>
-          <a:p>
-            <a:r>
-              <a:rPr lang="en-US" dirty="0" smtClean="0"/>
-              <a:t>Client-side</a:t>
-            </a:r>
-          </a:p>
-          <a:p>
-            <a:pPr lvl="1"/>
-            <a:r>
-              <a:rPr lang="en-US" dirty="0" smtClean="0"/>
-              <a:t>HTML &amp; JavaScript</a:t>
-            </a:r>
-          </a:p>
-          <a:p>
-            <a:r>
-              <a:rPr lang="en-US" dirty="0" smtClean="0"/>
+              <a:t> </a:t>
+            </a:r>
+            <a:r>
+              <a:rPr lang="en-US" dirty="0"/>
+              <a:t>strongly-typed</a:t>
+            </a:r>
+          </a:p>
+          <a:p>
+            <a:r>
+              <a:rPr lang="en-US" dirty="0"/>
               <a:t>“.iced” files</a:t>
             </a:r>
-            <a:endParaRPr lang="en-US" dirty="0"/>
           </a:p>
         </p:txBody>
       </p:sp>
@@ -4191,31 +4216,126 @@
           <a:p>
             <a:r>
               <a:rPr lang="en-US" dirty="0" smtClean="0"/>
-              <a:t>Dictionaries</a:t>
-            </a:r>
-            <a:endParaRPr lang="en-US" dirty="0"/>
-          </a:p>
-        </p:txBody>
-      </p:sp>
-      <p:sp>
-        <p:nvSpPr>
-          <p:cNvPr id="3" name="Content Placeholder 2"/>
-          <p:cNvSpPr>
-            <a:spLocks noGrp="1"/>
-          </p:cNvSpPr>
-          <p:nvPr>
-            <p:ph idx="1"/>
-          </p:nvPr>
-        </p:nvSpPr>
-        <p:spPr/>
-        <p:txBody>
-          <a:bodyPr/>
-          <a:lstStyle/>
-          <a:p>
-            <a:endParaRPr lang="en-US" dirty="0"/>
-          </a:p>
-        </p:txBody>
-      </p:sp>
+              <a:t>Dictionaries               </a:t>
+            </a:r>
+            <a:r>
+              <a:rPr lang="en-US" sz="2000" dirty="0" smtClean="0"/>
+              <a:t>Our </a:t>
+            </a:r>
+            <a:r>
+              <a:rPr lang="en-US" sz="2000" dirty="0"/>
+              <a:t>Dictionary Uses:</a:t>
+            </a:r>
+            <a:r>
+              <a:rPr lang="en-US" dirty="0" smtClean="0"/>
+              <a:t/>
+            </a:r>
+            <a:br>
+              <a:rPr lang="en-US" dirty="0" smtClean="0"/>
+            </a:br>
+            <a:r>
+              <a:rPr lang="en-US" sz="2000" dirty="0" smtClean="0"/>
+              <a:t> Examples:				</a:t>
+            </a:r>
+            <a:endParaRPr lang="en-US" dirty="0"/>
+          </a:p>
+        </p:txBody>
+      </p:sp>
+      <p:pic>
+        <p:nvPicPr>
+          <p:cNvPr id="4" name="Picture 3"/>
+          <p:cNvPicPr>
+            <a:picLocks noChangeAspect="1"/>
+          </p:cNvPicPr>
+          <p:nvPr/>
+        </p:nvPicPr>
+        <p:blipFill>
+          <a:blip r:embed="rId2"/>
+          <a:stretch>
+            <a:fillRect/>
+          </a:stretch>
+        </p:blipFill>
+        <p:spPr>
+          <a:xfrm>
+            <a:off x="1497875" y="1689463"/>
+            <a:ext cx="4583546" cy="5185954"/>
+          </a:xfrm>
+          <a:prstGeom prst="rect">
+            <a:avLst/>
+          </a:prstGeom>
+        </p:spPr>
+      </p:pic>
+      <p:pic>
+        <p:nvPicPr>
+          <p:cNvPr id="5" name="Picture 4"/>
+          <p:cNvPicPr>
+            <a:picLocks noChangeAspect="1"/>
+          </p:cNvPicPr>
+          <p:nvPr/>
+        </p:nvPicPr>
+        <p:blipFill rotWithShape="1">
+          <a:blip r:embed="rId3"/>
+          <a:srcRect b="1164"/>
+          <a:stretch/>
+        </p:blipFill>
+        <p:spPr>
+          <a:xfrm>
+            <a:off x="6411277" y="5004557"/>
+            <a:ext cx="3556947" cy="1849090"/>
+          </a:xfrm>
+          <a:prstGeom prst="rect">
+            <a:avLst/>
+          </a:prstGeom>
+        </p:spPr>
+      </p:pic>
+      <p:pic>
+        <p:nvPicPr>
+          <p:cNvPr id="6" name="Picture 5"/>
+          <p:cNvPicPr>
+            <a:picLocks noChangeAspect="1"/>
+          </p:cNvPicPr>
+          <p:nvPr/>
+        </p:nvPicPr>
+        <p:blipFill>
+          <a:blip r:embed="rId4"/>
+          <a:stretch>
+            <a:fillRect/>
+          </a:stretch>
+        </p:blipFill>
+        <p:spPr>
+          <a:xfrm>
+            <a:off x="6411277" y="1319212"/>
+            <a:ext cx="3514725" cy="1704975"/>
+          </a:xfrm>
+          <a:prstGeom prst="rect">
+            <a:avLst/>
+          </a:prstGeom>
+        </p:spPr>
+      </p:pic>
+      <p:pic>
+        <p:nvPicPr>
+          <p:cNvPr id="7" name="Picture 6"/>
+          <p:cNvPicPr>
+            <a:picLocks noChangeAspect="1"/>
+          </p:cNvPicPr>
+          <p:nvPr/>
+        </p:nvPicPr>
+        <p:blipFill>
+          <a:blip r:embed="rId5"/>
+          <a:stretch>
+            <a:fillRect/>
+          </a:stretch>
+        </p:blipFill>
+        <p:spPr>
+          <a:xfrm>
+            <a:off x="6411277" y="3057109"/>
+            <a:ext cx="5562600" cy="1914525"/>
+          </a:xfrm>
+          <a:prstGeom prst="rect">
+            <a:avLst/>
+          </a:prstGeom>
+        </p:spPr>
+      </p:pic>
     </p:spTree>
     <p:extLst>
       <p:ext uri="{BB962C8B-B14F-4D97-AF65-F5344CB8AC3E}">
@@ -4262,8 +4382,12 @@
           <a:lstStyle/>
           <a:p>
             <a:r>
+              <a:rPr lang="en-US" dirty="0"/>
+              <a:t>Handling “Keywords</a:t>
+            </a:r>
+            <a:r>
               <a:rPr lang="en-US" dirty="0" smtClean="0"/>
-              <a:t>Handling “Keywords”</a:t>
+              <a:t>” (Logic)</a:t>
             </a:r>
             <a:endParaRPr lang="en-US" dirty="0"/>
           </a:p>
@@ -4284,20 +4408,89 @@
           <a:bodyPr/>
           <a:lstStyle/>
           <a:p>
-            <a:endParaRPr lang="en-US"/>
+            <a:pPr marL="457200" indent="-457200">
+              <a:buFont typeface="+mj-lt"/>
+              <a:buAutoNum type="arabicPeriod"/>
+            </a:pPr>
+            <a:r>
+              <a:rPr lang="en-US" dirty="0" smtClean="0"/>
+              <a:t>Get string of input</a:t>
+            </a:r>
+          </a:p>
+          <a:p>
+            <a:pPr marL="457200" indent="-457200">
+              <a:buFont typeface="+mj-lt"/>
+              <a:buAutoNum type="arabicPeriod"/>
+            </a:pPr>
+            <a:r>
+              <a:rPr lang="en-US" dirty="0" smtClean="0"/>
+              <a:t>Split string by semicolons to get </a:t>
+            </a:r>
+            <a:r>
+              <a:rPr lang="en-US" i="1" dirty="0" smtClean="0"/>
+              <a:t>statements</a:t>
+            </a:r>
+            <a:endParaRPr lang="en-US" dirty="0" smtClean="0"/>
+          </a:p>
+          <a:p>
+            <a:pPr marL="457200" indent="-457200">
+              <a:buFont typeface="+mj-lt"/>
+              <a:buAutoNum type="arabicPeriod"/>
+            </a:pPr>
+            <a:r>
+              <a:rPr lang="en-US" dirty="0" smtClean="0"/>
+              <a:t>Loop through statements</a:t>
+            </a:r>
+          </a:p>
+          <a:p>
+            <a:pPr marL="457200" indent="-457200">
+              <a:buFont typeface="+mj-lt"/>
+              <a:buAutoNum type="arabicPeriod"/>
+            </a:pPr>
+            <a:r>
+              <a:rPr lang="en-US" dirty="0" smtClean="0"/>
+              <a:t>Inside the loop, split each statement into words</a:t>
+            </a:r>
+          </a:p>
+          <a:p>
+            <a:pPr marL="457200" indent="-457200">
+              <a:buFont typeface="+mj-lt"/>
+              <a:buAutoNum type="arabicPeriod"/>
+            </a:pPr>
+            <a:r>
+              <a:rPr lang="en-US" dirty="0" smtClean="0"/>
+              <a:t>Check the keywords dictionary for the first word in the statement</a:t>
+            </a:r>
+          </a:p>
+          <a:p>
+            <a:pPr marL="457200" indent="-457200">
+              <a:buFont typeface="+mj-lt"/>
+              <a:buAutoNum type="arabicPeriod"/>
+            </a:pPr>
+            <a:r>
+              <a:rPr lang="en-US" dirty="0" smtClean="0"/>
+              <a:t>If word exists, handle that statement</a:t>
+            </a:r>
           </a:p>
         </p:txBody>
       </p:sp>
     </p:spTree>
     <p:extLst>
       <p:ext uri="{BB962C8B-B14F-4D97-AF65-F5344CB8AC3E}">
-        <p14:creationId xmlns:p14="http://schemas.microsoft.com/office/powerpoint/2010/main" val="1788783599"/>
+        <p14:creationId xmlns:p14="http://schemas.microsoft.com/office/powerpoint/2010/main" val="184119660"/>
       </p:ext>
     </p:extLst>
   </p:cSld>
   <p:clrMapOvr>
     <a:masterClrMapping/>
   </p:clrMapOvr>
+  <p:timing>
+    <p:tnLst>
+      <p:par>
+        <p:cTn id="1" dur="indefinite" restart="never" nodeType="tmRoot"/>
+      </p:par>
+    </p:tnLst>
+  </p:timing>
 </p:sld>
 </file>
 
@@ -4328,48 +4521,581 @@
             <p:ph type="title"/>
           </p:nvPr>
         </p:nvSpPr>
-        <p:spPr/>
+        <p:spPr>
+          <a:xfrm>
+            <a:off x="1371600" y="685800"/>
+            <a:ext cx="9601200" cy="820783"/>
+          </a:xfrm>
+        </p:spPr>
         <p:txBody>
           <a:bodyPr/>
           <a:lstStyle/>
           <a:p>
             <a:r>
+              <a:rPr lang="en-US" dirty="0"/>
+              <a:t>Handling “Keywords</a:t>
+            </a:r>
+            <a:r>
               <a:rPr lang="en-US" dirty="0" smtClean="0"/>
-              <a:t>Text &amp; File Input</a:t>
-            </a:r>
-            <a:endParaRPr lang="en-US" dirty="0"/>
-          </a:p>
-        </p:txBody>
-      </p:sp>
-      <p:sp>
-        <p:nvSpPr>
-          <p:cNvPr id="3" name="Content Placeholder 2"/>
-          <p:cNvSpPr>
-            <a:spLocks noGrp="1"/>
-          </p:cNvSpPr>
-          <p:nvPr>
-            <p:ph idx="1"/>
-          </p:nvPr>
-        </p:nvSpPr>
-        <p:spPr/>
-        <p:txBody>
-          <a:bodyPr/>
+              <a:t>” (Code)</a:t>
+            </a:r>
+            <a:endParaRPr lang="en-US" dirty="0"/>
+          </a:p>
+        </p:txBody>
+      </p:sp>
+      <p:sp>
+        <p:nvSpPr>
+          <p:cNvPr id="7" name="TextBox 6"/>
+          <p:cNvSpPr txBox="1"/>
+          <p:nvPr/>
+        </p:nvSpPr>
+        <p:spPr>
+          <a:xfrm>
+            <a:off x="1371600" y="1598879"/>
+            <a:ext cx="3056709" cy="369332"/>
+          </a:xfrm>
+          <a:prstGeom prst="rect">
+            <a:avLst/>
+          </a:prstGeom>
+          <a:noFill/>
+        </p:spPr>
+        <p:txBody>
+          <a:bodyPr wrap="square" rtlCol="0">
+            <a:spAutoFit/>
+          </a:bodyPr>
           <a:lstStyle/>
           <a:p>
-            <a:endParaRPr lang="en-US"/>
+            <a:r>
+              <a:rPr lang="en-US" dirty="0" smtClean="0"/>
+              <a:t>Splitting text into </a:t>
+            </a:r>
+            <a:r>
+              <a:rPr lang="en-US" i="1" dirty="0" smtClean="0"/>
+              <a:t>statements</a:t>
+            </a:r>
+            <a:endParaRPr lang="en-US" dirty="0"/>
+          </a:p>
+        </p:txBody>
+      </p:sp>
+      <p:pic>
+        <p:nvPicPr>
+          <p:cNvPr id="8" name="Picture 7"/>
+          <p:cNvPicPr>
+            <a:picLocks noChangeAspect="1"/>
+          </p:cNvPicPr>
+          <p:nvPr/>
+        </p:nvPicPr>
+        <p:blipFill>
+          <a:blip r:embed="rId2"/>
+          <a:stretch>
+            <a:fillRect/>
+          </a:stretch>
+        </p:blipFill>
+        <p:spPr>
+          <a:xfrm>
+            <a:off x="1371599" y="2434708"/>
+            <a:ext cx="4930539" cy="1466731"/>
+          </a:xfrm>
+          <a:prstGeom prst="rect">
+            <a:avLst/>
+          </a:prstGeom>
+        </p:spPr>
+      </p:pic>
+      <p:pic>
+        <p:nvPicPr>
+          <p:cNvPr id="9" name="Picture 8"/>
+          <p:cNvPicPr>
+            <a:picLocks noChangeAspect="1"/>
+          </p:cNvPicPr>
+          <p:nvPr/>
+        </p:nvPicPr>
+        <p:blipFill>
+          <a:blip r:embed="rId3"/>
+          <a:stretch>
+            <a:fillRect/>
+          </a:stretch>
+        </p:blipFill>
+        <p:spPr>
+          <a:xfrm>
+            <a:off x="1371601" y="1941871"/>
+            <a:ext cx="3570914" cy="492838"/>
+          </a:xfrm>
+          <a:prstGeom prst="rect">
+            <a:avLst/>
+          </a:prstGeom>
+        </p:spPr>
+      </p:pic>
+      <p:pic>
+        <p:nvPicPr>
+          <p:cNvPr id="10" name="Picture 9"/>
+          <p:cNvPicPr>
+            <a:picLocks noChangeAspect="1"/>
+          </p:cNvPicPr>
+          <p:nvPr/>
+        </p:nvPicPr>
+        <p:blipFill>
+          <a:blip r:embed="rId4"/>
+          <a:stretch>
+            <a:fillRect/>
+          </a:stretch>
+        </p:blipFill>
+        <p:spPr>
+          <a:xfrm>
+            <a:off x="1371600" y="4501264"/>
+            <a:ext cx="2643051" cy="513927"/>
+          </a:xfrm>
+          <a:prstGeom prst="rect">
+            <a:avLst/>
+          </a:prstGeom>
+        </p:spPr>
+      </p:pic>
+      <p:sp>
+        <p:nvSpPr>
+          <p:cNvPr id="11" name="TextBox 10"/>
+          <p:cNvSpPr txBox="1"/>
+          <p:nvPr/>
+        </p:nvSpPr>
+        <p:spPr>
+          <a:xfrm>
+            <a:off x="1371600" y="4131932"/>
+            <a:ext cx="3056709" cy="369332"/>
+          </a:xfrm>
+          <a:prstGeom prst="rect">
+            <a:avLst/>
+          </a:prstGeom>
+          <a:noFill/>
+        </p:spPr>
+        <p:txBody>
+          <a:bodyPr wrap="square" rtlCol="0">
+            <a:spAutoFit/>
+          </a:bodyPr>
+          <a:lstStyle/>
+          <a:p>
+            <a:r>
+              <a:rPr lang="en-US" dirty="0" smtClean="0"/>
+              <a:t>Splitting statement into </a:t>
+            </a:r>
+            <a:r>
+              <a:rPr lang="en-US" i="1" dirty="0" smtClean="0"/>
+              <a:t>words</a:t>
+            </a:r>
+            <a:endParaRPr lang="en-US" dirty="0"/>
+          </a:p>
+        </p:txBody>
+      </p:sp>
+      <p:pic>
+        <p:nvPicPr>
+          <p:cNvPr id="12" name="Picture 11"/>
+          <p:cNvPicPr>
+            <a:picLocks noChangeAspect="1"/>
+          </p:cNvPicPr>
+          <p:nvPr/>
+        </p:nvPicPr>
+        <p:blipFill>
+          <a:blip r:embed="rId5"/>
+          <a:stretch>
+            <a:fillRect/>
+          </a:stretch>
+        </p:blipFill>
+        <p:spPr>
+          <a:xfrm>
+            <a:off x="1371600" y="5015191"/>
+            <a:ext cx="4930538" cy="1420387"/>
+          </a:xfrm>
+          <a:prstGeom prst="rect">
+            <a:avLst/>
+          </a:prstGeom>
+        </p:spPr>
+      </p:pic>
+      <p:pic>
+        <p:nvPicPr>
+          <p:cNvPr id="13" name="Picture 12"/>
+          <p:cNvPicPr>
+            <a:picLocks noChangeAspect="1"/>
+          </p:cNvPicPr>
+          <p:nvPr/>
+        </p:nvPicPr>
+        <p:blipFill>
+          <a:blip r:embed="rId6"/>
+          <a:stretch>
+            <a:fillRect/>
+          </a:stretch>
+        </p:blipFill>
+        <p:spPr>
+          <a:xfrm>
+            <a:off x="6513195" y="1941870"/>
+            <a:ext cx="4641931" cy="1959569"/>
+          </a:xfrm>
+          <a:prstGeom prst="rect">
+            <a:avLst/>
+          </a:prstGeom>
+        </p:spPr>
+      </p:pic>
+      <p:sp>
+        <p:nvSpPr>
+          <p:cNvPr id="14" name="TextBox 13"/>
+          <p:cNvSpPr txBox="1"/>
+          <p:nvPr/>
+        </p:nvSpPr>
+        <p:spPr>
+          <a:xfrm>
+            <a:off x="6490198" y="1598879"/>
+            <a:ext cx="3056709" cy="369332"/>
+          </a:xfrm>
+          <a:prstGeom prst="rect">
+            <a:avLst/>
+          </a:prstGeom>
+          <a:noFill/>
+        </p:spPr>
+        <p:txBody>
+          <a:bodyPr wrap="square" rtlCol="0">
+            <a:spAutoFit/>
+          </a:bodyPr>
+          <a:lstStyle/>
+          <a:p>
+            <a:r>
+              <a:rPr lang="en-US" dirty="0" smtClean="0"/>
+              <a:t>Checking if </a:t>
+            </a:r>
+            <a:r>
+              <a:rPr lang="en-US" i="1" dirty="0" smtClean="0"/>
+              <a:t>word </a:t>
+            </a:r>
+            <a:r>
+              <a:rPr lang="en-US" dirty="0" smtClean="0"/>
+              <a:t>exists</a:t>
+            </a:r>
+            <a:endParaRPr lang="en-US" dirty="0"/>
           </a:p>
         </p:txBody>
       </p:sp>
     </p:spTree>
     <p:extLst>
       <p:ext uri="{BB962C8B-B14F-4D97-AF65-F5344CB8AC3E}">
-        <p14:creationId xmlns:p14="http://schemas.microsoft.com/office/powerpoint/2010/main" val="184119660"/>
+        <p14:creationId xmlns:p14="http://schemas.microsoft.com/office/powerpoint/2010/main" val="80776987"/>
       </p:ext>
     </p:extLst>
   </p:cSld>
   <p:clrMapOvr>
     <a:masterClrMapping/>
   </p:clrMapOvr>
+  <p:timing>
+    <p:tnLst>
+      <p:par>
+        <p:cTn id="1" dur="indefinite" restart="never" nodeType="tmRoot"/>
+      </p:par>
+    </p:tnLst>
+  </p:timing>
+</p:sld>
+</file>
+
+<file path=ppt/slides/slide8.xml><?xml version="1.0" encoding="utf-8"?>
+<p:sld xmlns:a="http://schemas.openxmlformats.org/drawingml/2006/main" xmlns:r="http://schemas.openxmlformats.org/officeDocument/2006/relationships" xmlns:p="http://schemas.openxmlformats.org/presentationml/2006/main">
+  <p:cSld>
+    <p:spTree>
+      <p:nvGrpSpPr>
+        <p:cNvPr id="1" name=""/>
+        <p:cNvGrpSpPr/>
+        <p:nvPr/>
+      </p:nvGrpSpPr>
+      <p:grpSpPr>
+        <a:xfrm>
+          <a:off x="0" y="0"/>
+          <a:ext cx="0" cy="0"/>
+          <a:chOff x="0" y="0"/>
+          <a:chExt cx="0" cy="0"/>
+        </a:xfrm>
+      </p:grpSpPr>
+      <p:sp>
+        <p:nvSpPr>
+          <p:cNvPr id="2" name="Title 1"/>
+          <p:cNvSpPr>
+            <a:spLocks noGrp="1"/>
+          </p:cNvSpPr>
+          <p:nvPr>
+            <p:ph type="title"/>
+          </p:nvPr>
+        </p:nvSpPr>
+        <p:spPr/>
+        <p:txBody>
+          <a:bodyPr/>
+          <a:lstStyle/>
+          <a:p>
+            <a:r>
+              <a:rPr lang="en-US" dirty="0" smtClean="0"/>
+              <a:t>Text &amp; File </a:t>
+            </a:r>
+            <a:r>
+              <a:rPr lang="en-US" dirty="0" smtClean="0"/>
+              <a:t>Input</a:t>
+            </a:r>
+            <a:endParaRPr lang="en-US" dirty="0"/>
+          </a:p>
+        </p:txBody>
+      </p:sp>
+      <p:pic>
+        <p:nvPicPr>
+          <p:cNvPr id="4" name="Picture 3"/>
+          <p:cNvPicPr>
+            <a:picLocks noChangeAspect="1"/>
+          </p:cNvPicPr>
+          <p:nvPr/>
+        </p:nvPicPr>
+        <p:blipFill>
+          <a:blip r:embed="rId2"/>
+          <a:stretch>
+            <a:fillRect/>
+          </a:stretch>
+        </p:blipFill>
+        <p:spPr>
+          <a:xfrm>
+            <a:off x="1371600" y="2171700"/>
+            <a:ext cx="7162800" cy="4333875"/>
+          </a:xfrm>
+          <a:prstGeom prst="rect">
+            <a:avLst/>
+          </a:prstGeom>
+        </p:spPr>
+      </p:pic>
+      <p:sp>
+        <p:nvSpPr>
+          <p:cNvPr id="5" name="TextBox 4"/>
+          <p:cNvSpPr txBox="1"/>
+          <p:nvPr/>
+        </p:nvSpPr>
+        <p:spPr>
+          <a:xfrm>
+            <a:off x="1371600" y="1802368"/>
+            <a:ext cx="3056709" cy="369332"/>
+          </a:xfrm>
+          <a:prstGeom prst="rect">
+            <a:avLst/>
+          </a:prstGeom>
+          <a:noFill/>
+        </p:spPr>
+        <p:txBody>
+          <a:bodyPr wrap="square" rtlCol="0">
+            <a:spAutoFit/>
+          </a:bodyPr>
+          <a:lstStyle/>
+          <a:p>
+            <a:r>
+              <a:rPr lang="en-US" dirty="0" smtClean="0"/>
+              <a:t>Getting file input</a:t>
+            </a:r>
+            <a:endParaRPr lang="en-US" dirty="0"/>
+          </a:p>
+        </p:txBody>
+      </p:sp>
+      <p:sp>
+        <p:nvSpPr>
+          <p:cNvPr id="12" name="Rectangle 11"/>
+          <p:cNvSpPr/>
+          <p:nvPr/>
+        </p:nvSpPr>
+        <p:spPr>
+          <a:xfrm>
+            <a:off x="1715589" y="4119154"/>
+            <a:ext cx="1576251" cy="383177"/>
+          </a:xfrm>
+          <a:prstGeom prst="rect">
+            <a:avLst/>
+          </a:prstGeom>
+          <a:noFill/>
+          <a:ln>
+            <a:solidFill>
+              <a:srgbClr val="FF0000"/>
+            </a:solidFill>
+          </a:ln>
+        </p:spPr>
+        <p:style>
+          <a:lnRef idx="2">
+            <a:schemeClr val="accent6"/>
+          </a:lnRef>
+          <a:fillRef idx="1">
+            <a:schemeClr val="lt1"/>
+          </a:fillRef>
+          <a:effectRef idx="0">
+            <a:schemeClr val="accent6"/>
+          </a:effectRef>
+          <a:fontRef idx="minor">
+            <a:schemeClr val="dk1"/>
+          </a:fontRef>
+        </p:style>
+        <p:txBody>
+          <a:bodyPr rtlCol="0" anchor="ctr"/>
+          <a:lstStyle/>
+          <a:p>
+            <a:pPr algn="ctr"/>
+            <a:endParaRPr lang="en-US"/>
+          </a:p>
+        </p:txBody>
+      </p:sp>
+    </p:spTree>
+    <p:extLst>
+      <p:ext uri="{BB962C8B-B14F-4D97-AF65-F5344CB8AC3E}">
+        <p14:creationId xmlns:p14="http://schemas.microsoft.com/office/powerpoint/2010/main" val="680889864"/>
+      </p:ext>
+    </p:extLst>
+  </p:cSld>
+  <p:clrMapOvr>
+    <a:masterClrMapping/>
+  </p:clrMapOvr>
+  <p:timing>
+    <p:tnLst>
+      <p:par>
+        <p:cTn id="1" dur="indefinite" restart="never" nodeType="tmRoot">
+          <p:childTnLst>
+            <p:seq concurrent="1" nextAc="seek">
+              <p:cTn id="2" dur="indefinite" nodeType="mainSeq">
+                <p:childTnLst>
+                  <p:par>
+                    <p:cTn id="3" fill="hold">
+                      <p:stCondLst>
+                        <p:cond delay="indefinite"/>
+                      </p:stCondLst>
+                      <p:childTnLst>
+                        <p:par>
+                          <p:cTn id="4" fill="hold">
+                            <p:stCondLst>
+                              <p:cond delay="0"/>
+                            </p:stCondLst>
+                            <p:childTnLst>
+                              <p:par>
+                                <p:cTn id="5" presetID="31" presetClass="entr" presetSubtype="0" fill="hold" grpId="0" nodeType="clickEffect">
+                                  <p:stCondLst>
+                                    <p:cond delay="0"/>
+                                  </p:stCondLst>
+                                  <p:childTnLst>
+                                    <p:set>
+                                      <p:cBhvr>
+                                        <p:cTn id="6" dur="1" fill="hold">
+                                          <p:stCondLst>
+                                            <p:cond delay="0"/>
+                                          </p:stCondLst>
+                                        </p:cTn>
+                                        <p:tgtEl>
+                                          <p:spTgt spid="12"/>
+                                        </p:tgtEl>
+                                        <p:attrNameLst>
+                                          <p:attrName>style.visibility</p:attrName>
+                                        </p:attrNameLst>
+                                      </p:cBhvr>
+                                      <p:to>
+                                        <p:strVal val="visible"/>
+                                      </p:to>
+                                    </p:set>
+                                    <p:anim calcmode="lin" valueType="num">
+                                      <p:cBhvr>
+                                        <p:cTn id="7" dur="1000" fill="hold"/>
+                                        <p:tgtEl>
+                                          <p:spTgt spid="12"/>
+                                        </p:tgtEl>
+                                        <p:attrNameLst>
+                                          <p:attrName>ppt_w</p:attrName>
+                                        </p:attrNameLst>
+                                      </p:cBhvr>
+                                      <p:tavLst>
+                                        <p:tav tm="0">
+                                          <p:val>
+                                            <p:fltVal val="0"/>
+                                          </p:val>
+                                        </p:tav>
+                                        <p:tav tm="100000">
+                                          <p:val>
+                                            <p:strVal val="#ppt_w"/>
+                                          </p:val>
+                                        </p:tav>
+                                      </p:tavLst>
+                                    </p:anim>
+                                    <p:anim calcmode="lin" valueType="num">
+                                      <p:cBhvr>
+                                        <p:cTn id="8" dur="1000" fill="hold"/>
+                                        <p:tgtEl>
+                                          <p:spTgt spid="12"/>
+                                        </p:tgtEl>
+                                        <p:attrNameLst>
+                                          <p:attrName>ppt_h</p:attrName>
+                                        </p:attrNameLst>
+                                      </p:cBhvr>
+                                      <p:tavLst>
+                                        <p:tav tm="0">
+                                          <p:val>
+                                            <p:fltVal val="0"/>
+                                          </p:val>
+                                        </p:tav>
+                                        <p:tav tm="100000">
+                                          <p:val>
+                                            <p:strVal val="#ppt_h"/>
+                                          </p:val>
+                                        </p:tav>
+                                      </p:tavLst>
+                                    </p:anim>
+                                    <p:anim calcmode="lin" valueType="num">
+                                      <p:cBhvr>
+                                        <p:cTn id="9" dur="1000" fill="hold"/>
+                                        <p:tgtEl>
+                                          <p:spTgt spid="12"/>
+                                        </p:tgtEl>
+                                        <p:attrNameLst>
+                                          <p:attrName>style.rotation</p:attrName>
+                                        </p:attrNameLst>
+                                      </p:cBhvr>
+                                      <p:tavLst>
+                                        <p:tav tm="0">
+                                          <p:val>
+                                            <p:fltVal val="90"/>
+                                          </p:val>
+                                        </p:tav>
+                                        <p:tav tm="100000">
+                                          <p:val>
+                                            <p:fltVal val="0"/>
+                                          </p:val>
+                                        </p:tav>
+                                      </p:tavLst>
+                                    </p:anim>
+                                    <p:animEffect transition="in" filter="fade">
+                                      <p:cBhvr>
+                                        <p:cTn id="10" dur="1000"/>
+                                        <p:tgtEl>
+                                          <p:spTgt spid="12"/>
+                                        </p:tgtEl>
+                                      </p:cBhvr>
+                                    </p:animEffect>
+                                  </p:childTnLst>
+                                </p:cTn>
+                              </p:par>
+                            </p:childTnLst>
+                          </p:cTn>
+                        </p:par>
+                      </p:childTnLst>
+                    </p:cTn>
+                  </p:par>
+                </p:childTnLst>
+              </p:cTn>
+              <p:prevCondLst>
+                <p:cond evt="onPrev" delay="0">
+                  <p:tgtEl>
+                    <p:sldTgt/>
+                  </p:tgtEl>
+                </p:cond>
+              </p:prevCondLst>
+              <p:nextCondLst>
+                <p:cond evt="onNext" delay="0">
+                  <p:tgtEl>
+                    <p:sldTgt/>
+                  </p:tgtEl>
+                </p:cond>
+              </p:nextCondLst>
+            </p:seq>
+          </p:childTnLst>
+        </p:cTn>
+      </p:par>
+    </p:tnLst>
+    <p:bldLst>
+      <p:bldP spid="12" grpId="0" animBg="1"/>
+    </p:bldLst>
+  </p:timing>
 </p:sld>
 </file>
 

</xml_diff>